<commit_message>
Transaction History and Contact List Pages
</commit_message>
<xml_diff>
--- a/Prototypes.pptx
+++ b/Prototypes.pptx
@@ -6,6 +6,7 @@
   </p:sldMasterIdLst>
   <p:sldIdLst>
     <p:sldId id="256" r:id="rId2"/>
+    <p:sldId id="257" r:id="rId3"/>
   </p:sldIdLst>
   <p:sldSz cx="12192000" cy="6858000"/>
   <p:notesSz cx="6858000" cy="9144000"/>
@@ -243,7 +244,7 @@
           <a:p>
             <a:fld id="{424D4720-A6F8-4B22-BC69-FBA6963A644B}" type="datetimeFigureOut">
               <a:rPr lang="en-US" smtClean="0"/>
-              <a:t>9/28/2013</a:t>
+              <a:t>10/5/2013</a:t>
             </a:fld>
             <a:endParaRPr lang="en-US"/>
           </a:p>
@@ -413,7 +414,7 @@
           <a:p>
             <a:fld id="{424D4720-A6F8-4B22-BC69-FBA6963A644B}" type="datetimeFigureOut">
               <a:rPr lang="en-US" smtClean="0"/>
-              <a:t>9/28/2013</a:t>
+              <a:t>10/5/2013</a:t>
             </a:fld>
             <a:endParaRPr lang="en-US"/>
           </a:p>
@@ -593,7 +594,7 @@
           <a:p>
             <a:fld id="{424D4720-A6F8-4B22-BC69-FBA6963A644B}" type="datetimeFigureOut">
               <a:rPr lang="en-US" smtClean="0"/>
-              <a:t>9/28/2013</a:t>
+              <a:t>10/5/2013</a:t>
             </a:fld>
             <a:endParaRPr lang="en-US"/>
           </a:p>
@@ -763,7 +764,7 @@
           <a:p>
             <a:fld id="{424D4720-A6F8-4B22-BC69-FBA6963A644B}" type="datetimeFigureOut">
               <a:rPr lang="en-US" smtClean="0"/>
-              <a:t>9/28/2013</a:t>
+              <a:t>10/5/2013</a:t>
             </a:fld>
             <a:endParaRPr lang="en-US"/>
           </a:p>
@@ -1009,7 +1010,7 @@
           <a:p>
             <a:fld id="{424D4720-A6F8-4B22-BC69-FBA6963A644B}" type="datetimeFigureOut">
               <a:rPr lang="en-US" smtClean="0"/>
-              <a:t>9/28/2013</a:t>
+              <a:t>10/5/2013</a:t>
             </a:fld>
             <a:endParaRPr lang="en-US"/>
           </a:p>
@@ -1241,7 +1242,7 @@
           <a:p>
             <a:fld id="{424D4720-A6F8-4B22-BC69-FBA6963A644B}" type="datetimeFigureOut">
               <a:rPr lang="en-US" smtClean="0"/>
-              <a:t>9/28/2013</a:t>
+              <a:t>10/5/2013</a:t>
             </a:fld>
             <a:endParaRPr lang="en-US"/>
           </a:p>
@@ -1608,7 +1609,7 @@
           <a:p>
             <a:fld id="{424D4720-A6F8-4B22-BC69-FBA6963A644B}" type="datetimeFigureOut">
               <a:rPr lang="en-US" smtClean="0"/>
-              <a:t>9/28/2013</a:t>
+              <a:t>10/5/2013</a:t>
             </a:fld>
             <a:endParaRPr lang="en-US"/>
           </a:p>
@@ -1726,7 +1727,7 @@
           <a:p>
             <a:fld id="{424D4720-A6F8-4B22-BC69-FBA6963A644B}" type="datetimeFigureOut">
               <a:rPr lang="en-US" smtClean="0"/>
-              <a:t>9/28/2013</a:t>
+              <a:t>10/5/2013</a:t>
             </a:fld>
             <a:endParaRPr lang="en-US"/>
           </a:p>
@@ -1821,7 +1822,7 @@
           <a:p>
             <a:fld id="{424D4720-A6F8-4B22-BC69-FBA6963A644B}" type="datetimeFigureOut">
               <a:rPr lang="en-US" smtClean="0"/>
-              <a:t>9/28/2013</a:t>
+              <a:t>10/5/2013</a:t>
             </a:fld>
             <a:endParaRPr lang="en-US"/>
           </a:p>
@@ -2098,7 +2099,7 @@
           <a:p>
             <a:fld id="{424D4720-A6F8-4B22-BC69-FBA6963A644B}" type="datetimeFigureOut">
               <a:rPr lang="en-US" smtClean="0"/>
-              <a:t>9/28/2013</a:t>
+              <a:t>10/5/2013</a:t>
             </a:fld>
             <a:endParaRPr lang="en-US"/>
           </a:p>
@@ -2351,7 +2352,7 @@
           <a:p>
             <a:fld id="{424D4720-A6F8-4B22-BC69-FBA6963A644B}" type="datetimeFigureOut">
               <a:rPr lang="en-US" smtClean="0"/>
-              <a:t>9/28/2013</a:t>
+              <a:t>10/5/2013</a:t>
             </a:fld>
             <a:endParaRPr lang="en-US"/>
           </a:p>
@@ -2564,7 +2565,7 @@
           <a:p>
             <a:fld id="{424D4720-A6F8-4B22-BC69-FBA6963A644B}" type="datetimeFigureOut">
               <a:rPr lang="en-US" smtClean="0"/>
-              <a:t>9/28/2013</a:t>
+              <a:t>10/5/2013</a:t>
             </a:fld>
             <a:endParaRPr lang="en-US"/>
           </a:p>
@@ -3189,8 +3190,8 @@
         </p:nvSpPr>
         <p:spPr>
           <a:xfrm>
-            <a:off x="696191" y="1121009"/>
-            <a:ext cx="1851789" cy="369332"/>
+            <a:off x="696191" y="774126"/>
+            <a:ext cx="2002471" cy="369332"/>
           </a:xfrm>
           <a:prstGeom prst="rect">
             <a:avLst/>
@@ -3204,10 +3205,14 @@
           <a:lstStyle/>
           <a:p>
             <a:r>
-              <a:rPr lang="en-US" dirty="0" smtClean="0"/>
+              <a:rPr lang="en-US" b="1" dirty="0" smtClean="0">
+                <a:latin typeface="HelveticaNeueLT W1G 45 Lt" panose="020B0403020202020204" pitchFamily="34" charset="0"/>
+              </a:rPr>
               <a:t>Upon App Launch</a:t>
             </a:r>
-            <a:endParaRPr lang="en-US" dirty="0"/>
+            <a:endParaRPr lang="en-US" b="1" dirty="0">
+              <a:latin typeface="HelveticaNeueLT W1G 45 Lt" panose="020B0403020202020204" pitchFamily="34" charset="0"/>
+            </a:endParaRPr>
           </a:p>
         </p:txBody>
       </p:sp>
@@ -3505,8 +3510,8 @@
         </p:nvSpPr>
         <p:spPr>
           <a:xfrm>
-            <a:off x="3732701" y="2107809"/>
-            <a:ext cx="2998839" cy="2400657"/>
+            <a:off x="9300650" y="290012"/>
+            <a:ext cx="2998839" cy="2031325"/>
           </a:xfrm>
           <a:prstGeom prst="rect">
             <a:avLst/>
@@ -3605,17 +3610,6 @@
               <a:rPr lang="en-US" sz="1200" dirty="0" smtClean="0"/>
               <a:t>Pay/Charge</a:t>
             </a:r>
-          </a:p>
-          <a:p>
-            <a:pPr marL="228600" indent="-228600">
-              <a:buAutoNum type="arabicPeriod"/>
-            </a:pPr>
-            <a:r>
-              <a:rPr lang="en-US" sz="1200" dirty="0" smtClean="0"/>
-              <a:t>Friends</a:t>
-            </a:r>
-          </a:p>
-          <a:p>
             <a:endParaRPr lang="en-US" sz="1200" dirty="0" smtClean="0"/>
           </a:p>
         </p:txBody>
@@ -4689,10 +4683,1258 @@
           </a:p>
         </p:txBody>
       </p:sp>
+      <p:sp>
+        <p:nvSpPr>
+          <p:cNvPr id="40" name="TextBox 39"/>
+          <p:cNvSpPr txBox="1"/>
+          <p:nvPr/>
+        </p:nvSpPr>
+        <p:spPr>
+          <a:xfrm>
+            <a:off x="696191" y="1184521"/>
+            <a:ext cx="1367234" cy="369332"/>
+          </a:xfrm>
+          <a:prstGeom prst="rect">
+            <a:avLst/>
+          </a:prstGeom>
+          <a:noFill/>
+        </p:spPr>
+        <p:txBody>
+          <a:bodyPr wrap="none" rtlCol="0">
+            <a:spAutoFit/>
+          </a:bodyPr>
+          <a:lstStyle/>
+          <a:p>
+            <a:r>
+              <a:rPr lang="en-US" dirty="0" smtClean="0">
+                <a:latin typeface="HelveticaNeueLT W1G 45 Lt" panose="020B0403020202020204" pitchFamily="34" charset="0"/>
+              </a:rPr>
+              <a:t>Pivot Item 1</a:t>
+            </a:r>
+            <a:endParaRPr lang="en-US" dirty="0">
+              <a:latin typeface="HelveticaNeueLT W1G 45 Lt" panose="020B0403020202020204" pitchFamily="34" charset="0"/>
+            </a:endParaRPr>
+          </a:p>
+        </p:txBody>
+      </p:sp>
+      <p:sp>
+        <p:nvSpPr>
+          <p:cNvPr id="41" name="TextBox 40"/>
+          <p:cNvSpPr txBox="1"/>
+          <p:nvPr/>
+        </p:nvSpPr>
+        <p:spPr>
+          <a:xfrm>
+            <a:off x="6362609" y="1181531"/>
+            <a:ext cx="1367234" cy="369332"/>
+          </a:xfrm>
+          <a:prstGeom prst="rect">
+            <a:avLst/>
+          </a:prstGeom>
+          <a:noFill/>
+        </p:spPr>
+        <p:txBody>
+          <a:bodyPr wrap="none" rtlCol="0">
+            <a:spAutoFit/>
+          </a:bodyPr>
+          <a:lstStyle/>
+          <a:p>
+            <a:r>
+              <a:rPr lang="en-US" dirty="0" smtClean="0">
+                <a:latin typeface="HelveticaNeueLT W1G 45 Lt" panose="020B0403020202020204" pitchFamily="34" charset="0"/>
+              </a:rPr>
+              <a:t>Pivot Item 2</a:t>
+            </a:r>
+            <a:endParaRPr lang="en-US" dirty="0">
+              <a:latin typeface="HelveticaNeueLT W1G 45 Lt" panose="020B0403020202020204" pitchFamily="34" charset="0"/>
+            </a:endParaRPr>
+          </a:p>
+        </p:txBody>
+      </p:sp>
     </p:spTree>
     <p:extLst>
       <p:ext uri="{BB962C8B-B14F-4D97-AF65-F5344CB8AC3E}">
         <p14:creationId xmlns:p14="http://schemas.microsoft.com/office/powerpoint/2010/main" val="958601267"/>
+      </p:ext>
+    </p:extLst>
+  </p:cSld>
+  <p:clrMapOvr>
+    <a:masterClrMapping/>
+  </p:clrMapOvr>
+  <p:timing>
+    <p:tnLst>
+      <p:par>
+        <p:cTn id="1" dur="indefinite" restart="never" nodeType="tmRoot"/>
+      </p:par>
+    </p:tnLst>
+  </p:timing>
+</p:sld>
+</file>
+
+<file path=ppt/slides/slide2.xml><?xml version="1.0" encoding="utf-8"?>
+<p:sld xmlns:a="http://schemas.openxmlformats.org/drawingml/2006/main" xmlns:r="http://schemas.openxmlformats.org/officeDocument/2006/relationships" xmlns:p="http://schemas.openxmlformats.org/presentationml/2006/main">
+  <p:cSld>
+    <p:spTree>
+      <p:nvGrpSpPr>
+        <p:cNvPr id="1" name=""/>
+        <p:cNvGrpSpPr/>
+        <p:nvPr/>
+      </p:nvGrpSpPr>
+      <p:grpSpPr>
+        <a:xfrm>
+          <a:off x="0" y="0"/>
+          <a:ext cx="0" cy="0"/>
+          <a:chOff x="0" y="0"/>
+          <a:chExt cx="0" cy="0"/>
+        </a:xfrm>
+      </p:grpSpPr>
+      <p:sp>
+        <p:nvSpPr>
+          <p:cNvPr id="4" name="Rectangle 3"/>
+          <p:cNvSpPr/>
+          <p:nvPr/>
+        </p:nvSpPr>
+        <p:spPr>
+          <a:xfrm>
+            <a:off x="561107" y="1558651"/>
+            <a:ext cx="2805546" cy="4195043"/>
+          </a:xfrm>
+          <a:prstGeom prst="rect">
+            <a:avLst/>
+          </a:prstGeom>
+        </p:spPr>
+        <p:style>
+          <a:lnRef idx="2">
+            <a:schemeClr val="accent1"/>
+          </a:lnRef>
+          <a:fillRef idx="1">
+            <a:schemeClr val="lt1"/>
+          </a:fillRef>
+          <a:effectRef idx="0">
+            <a:schemeClr val="accent1"/>
+          </a:effectRef>
+          <a:fontRef idx="minor">
+            <a:schemeClr val="dk1"/>
+          </a:fontRef>
+        </p:style>
+        <p:txBody>
+          <a:bodyPr rtlCol="0" anchor="ctr"/>
+          <a:lstStyle/>
+          <a:p>
+            <a:pPr algn="ctr"/>
+            <a:endParaRPr lang="en-US" dirty="0"/>
+          </a:p>
+        </p:txBody>
+      </p:sp>
+      <p:sp>
+        <p:nvSpPr>
+          <p:cNvPr id="5" name="TextBox 4"/>
+          <p:cNvSpPr txBox="1"/>
+          <p:nvPr/>
+        </p:nvSpPr>
+        <p:spPr>
+          <a:xfrm>
+            <a:off x="457198" y="1027000"/>
+            <a:ext cx="2071529" cy="369332"/>
+          </a:xfrm>
+          <a:prstGeom prst="rect">
+            <a:avLst/>
+          </a:prstGeom>
+          <a:noFill/>
+        </p:spPr>
+        <p:txBody>
+          <a:bodyPr wrap="none" rtlCol="0">
+            <a:spAutoFit/>
+          </a:bodyPr>
+          <a:lstStyle/>
+          <a:p>
+            <a:r>
+              <a:rPr lang="en-US" dirty="0" smtClean="0">
+                <a:latin typeface="HelveticaNeueLT W1G 45 Lt" panose="020B0403020202020204" pitchFamily="34" charset="0"/>
+              </a:rPr>
+              <a:t>Transaction History</a:t>
+            </a:r>
+            <a:endParaRPr lang="en-US" dirty="0">
+              <a:latin typeface="HelveticaNeueLT W1G 45 Lt" panose="020B0403020202020204" pitchFamily="34" charset="0"/>
+            </a:endParaRPr>
+          </a:p>
+        </p:txBody>
+      </p:sp>
+      <p:grpSp>
+        <p:nvGrpSpPr>
+          <p:cNvPr id="13" name="Group 12"/>
+          <p:cNvGrpSpPr/>
+          <p:nvPr/>
+        </p:nvGrpSpPr>
+        <p:grpSpPr>
+          <a:xfrm>
+            <a:off x="780609" y="2114450"/>
+            <a:ext cx="561110" cy="586795"/>
+            <a:chOff x="5392881" y="2251942"/>
+            <a:chExt cx="561110" cy="586795"/>
+          </a:xfrm>
+        </p:grpSpPr>
+        <p:sp>
+          <p:nvSpPr>
+            <p:cNvPr id="6" name="Rectangle 5"/>
+            <p:cNvSpPr/>
+            <p:nvPr/>
+          </p:nvSpPr>
+          <p:spPr>
+            <a:xfrm>
+              <a:off x="5392881" y="2251942"/>
+              <a:ext cx="561110" cy="561110"/>
+            </a:xfrm>
+            <a:prstGeom prst="rect">
+              <a:avLst/>
+            </a:prstGeom>
+          </p:spPr>
+          <p:style>
+            <a:lnRef idx="2">
+              <a:schemeClr val="accent1">
+                <a:shade val="50000"/>
+              </a:schemeClr>
+            </a:lnRef>
+            <a:fillRef idx="1">
+              <a:schemeClr val="accent1"/>
+            </a:fillRef>
+            <a:effectRef idx="0">
+              <a:schemeClr val="accent1"/>
+            </a:effectRef>
+            <a:fontRef idx="minor">
+              <a:schemeClr val="lt1"/>
+            </a:fontRef>
+          </p:style>
+          <p:txBody>
+            <a:bodyPr rtlCol="0" anchor="ctr"/>
+            <a:lstStyle/>
+            <a:p>
+              <a:pPr algn="ctr"/>
+              <a:endParaRPr lang="en-US"/>
+            </a:p>
+          </p:txBody>
+        </p:sp>
+        <p:sp>
+          <p:nvSpPr>
+            <p:cNvPr id="11" name="Oval 10"/>
+            <p:cNvSpPr/>
+            <p:nvPr/>
+          </p:nvSpPr>
+          <p:spPr>
+            <a:xfrm>
+              <a:off x="5528395" y="2400299"/>
+              <a:ext cx="290081" cy="290081"/>
+            </a:xfrm>
+            <a:prstGeom prst="ellipse">
+              <a:avLst/>
+            </a:prstGeom>
+            <a:solidFill>
+              <a:schemeClr val="bg1"/>
+            </a:solidFill>
+            <a:ln>
+              <a:solidFill>
+                <a:schemeClr val="accent5">
+                  <a:lumMod val="60000"/>
+                  <a:lumOff val="40000"/>
+                </a:schemeClr>
+              </a:solidFill>
+            </a:ln>
+          </p:spPr>
+          <p:style>
+            <a:lnRef idx="2">
+              <a:schemeClr val="accent1">
+                <a:shade val="50000"/>
+              </a:schemeClr>
+            </a:lnRef>
+            <a:fillRef idx="1">
+              <a:schemeClr val="accent1"/>
+            </a:fillRef>
+            <a:effectRef idx="0">
+              <a:schemeClr val="accent1"/>
+            </a:effectRef>
+            <a:fontRef idx="minor">
+              <a:schemeClr val="lt1"/>
+            </a:fontRef>
+          </p:style>
+          <p:txBody>
+            <a:bodyPr rtlCol="0" anchor="ctr"/>
+            <a:lstStyle/>
+            <a:p>
+              <a:pPr algn="ctr"/>
+              <a:endParaRPr lang="en-US"/>
+            </a:p>
+          </p:txBody>
+        </p:sp>
+        <p:sp>
+          <p:nvSpPr>
+            <p:cNvPr id="12" name="Snip Same Side Corner Rectangle 11"/>
+            <p:cNvSpPr/>
+            <p:nvPr/>
+          </p:nvSpPr>
+          <p:spPr>
+            <a:xfrm>
+              <a:off x="5528395" y="2703222"/>
+              <a:ext cx="311727" cy="135515"/>
+            </a:xfrm>
+            <a:prstGeom prst="snip2SameRect">
+              <a:avLst/>
+            </a:prstGeom>
+            <a:solidFill>
+              <a:schemeClr val="bg1"/>
+            </a:solidFill>
+            <a:ln>
+              <a:noFill/>
+            </a:ln>
+          </p:spPr>
+          <p:style>
+            <a:lnRef idx="2">
+              <a:schemeClr val="accent1">
+                <a:shade val="50000"/>
+              </a:schemeClr>
+            </a:lnRef>
+            <a:fillRef idx="1">
+              <a:schemeClr val="accent1"/>
+            </a:fillRef>
+            <a:effectRef idx="0">
+              <a:schemeClr val="accent1"/>
+            </a:effectRef>
+            <a:fontRef idx="minor">
+              <a:schemeClr val="lt1"/>
+            </a:fontRef>
+          </p:style>
+          <p:txBody>
+            <a:bodyPr rtlCol="0" anchor="ctr"/>
+            <a:lstStyle/>
+            <a:p>
+              <a:pPr algn="ctr"/>
+              <a:endParaRPr lang="en-US"/>
+            </a:p>
+          </p:txBody>
+        </p:sp>
+      </p:grpSp>
+      <p:grpSp>
+        <p:nvGrpSpPr>
+          <p:cNvPr id="14" name="Group 13"/>
+          <p:cNvGrpSpPr/>
+          <p:nvPr/>
+        </p:nvGrpSpPr>
+        <p:grpSpPr>
+          <a:xfrm>
+            <a:off x="758965" y="2798349"/>
+            <a:ext cx="561110" cy="586795"/>
+            <a:chOff x="5392881" y="2251942"/>
+            <a:chExt cx="561110" cy="586795"/>
+          </a:xfrm>
+        </p:grpSpPr>
+        <p:sp>
+          <p:nvSpPr>
+            <p:cNvPr id="15" name="Rectangle 14"/>
+            <p:cNvSpPr/>
+            <p:nvPr/>
+          </p:nvSpPr>
+          <p:spPr>
+            <a:xfrm>
+              <a:off x="5392881" y="2251942"/>
+              <a:ext cx="561110" cy="561110"/>
+            </a:xfrm>
+            <a:prstGeom prst="rect">
+              <a:avLst/>
+            </a:prstGeom>
+          </p:spPr>
+          <p:style>
+            <a:lnRef idx="2">
+              <a:schemeClr val="accent1">
+                <a:shade val="50000"/>
+              </a:schemeClr>
+            </a:lnRef>
+            <a:fillRef idx="1">
+              <a:schemeClr val="accent1"/>
+            </a:fillRef>
+            <a:effectRef idx="0">
+              <a:schemeClr val="accent1"/>
+            </a:effectRef>
+            <a:fontRef idx="minor">
+              <a:schemeClr val="lt1"/>
+            </a:fontRef>
+          </p:style>
+          <p:txBody>
+            <a:bodyPr rtlCol="0" anchor="ctr"/>
+            <a:lstStyle/>
+            <a:p>
+              <a:pPr algn="ctr"/>
+              <a:endParaRPr lang="en-US"/>
+            </a:p>
+          </p:txBody>
+        </p:sp>
+        <p:sp>
+          <p:nvSpPr>
+            <p:cNvPr id="16" name="Oval 15"/>
+            <p:cNvSpPr/>
+            <p:nvPr/>
+          </p:nvSpPr>
+          <p:spPr>
+            <a:xfrm>
+              <a:off x="5528395" y="2400299"/>
+              <a:ext cx="290081" cy="290081"/>
+            </a:xfrm>
+            <a:prstGeom prst="ellipse">
+              <a:avLst/>
+            </a:prstGeom>
+            <a:solidFill>
+              <a:schemeClr val="bg1"/>
+            </a:solidFill>
+            <a:ln>
+              <a:solidFill>
+                <a:schemeClr val="accent5">
+                  <a:lumMod val="60000"/>
+                  <a:lumOff val="40000"/>
+                </a:schemeClr>
+              </a:solidFill>
+            </a:ln>
+          </p:spPr>
+          <p:style>
+            <a:lnRef idx="2">
+              <a:schemeClr val="accent1">
+                <a:shade val="50000"/>
+              </a:schemeClr>
+            </a:lnRef>
+            <a:fillRef idx="1">
+              <a:schemeClr val="accent1"/>
+            </a:fillRef>
+            <a:effectRef idx="0">
+              <a:schemeClr val="accent1"/>
+            </a:effectRef>
+            <a:fontRef idx="minor">
+              <a:schemeClr val="lt1"/>
+            </a:fontRef>
+          </p:style>
+          <p:txBody>
+            <a:bodyPr rtlCol="0" anchor="ctr"/>
+            <a:lstStyle/>
+            <a:p>
+              <a:pPr algn="ctr"/>
+              <a:endParaRPr lang="en-US"/>
+            </a:p>
+          </p:txBody>
+        </p:sp>
+        <p:sp>
+          <p:nvSpPr>
+            <p:cNvPr id="17" name="Snip Same Side Corner Rectangle 16"/>
+            <p:cNvSpPr/>
+            <p:nvPr/>
+          </p:nvSpPr>
+          <p:spPr>
+            <a:xfrm>
+              <a:off x="5528395" y="2703222"/>
+              <a:ext cx="311727" cy="135515"/>
+            </a:xfrm>
+            <a:prstGeom prst="snip2SameRect">
+              <a:avLst/>
+            </a:prstGeom>
+            <a:solidFill>
+              <a:schemeClr val="bg1"/>
+            </a:solidFill>
+            <a:ln>
+              <a:noFill/>
+            </a:ln>
+          </p:spPr>
+          <p:style>
+            <a:lnRef idx="2">
+              <a:schemeClr val="accent1">
+                <a:shade val="50000"/>
+              </a:schemeClr>
+            </a:lnRef>
+            <a:fillRef idx="1">
+              <a:schemeClr val="accent1"/>
+            </a:fillRef>
+            <a:effectRef idx="0">
+              <a:schemeClr val="accent1"/>
+            </a:effectRef>
+            <a:fontRef idx="minor">
+              <a:schemeClr val="lt1"/>
+            </a:fontRef>
+          </p:style>
+          <p:txBody>
+            <a:bodyPr rtlCol="0" anchor="ctr"/>
+            <a:lstStyle/>
+            <a:p>
+              <a:pPr algn="ctr"/>
+              <a:endParaRPr lang="en-US"/>
+            </a:p>
+          </p:txBody>
+        </p:sp>
+      </p:grpSp>
+      <p:grpSp>
+        <p:nvGrpSpPr>
+          <p:cNvPr id="18" name="Group 17"/>
+          <p:cNvGrpSpPr/>
+          <p:nvPr/>
+        </p:nvGrpSpPr>
+        <p:grpSpPr>
+          <a:xfrm>
+            <a:off x="758965" y="3507816"/>
+            <a:ext cx="561110" cy="586795"/>
+            <a:chOff x="5392881" y="2251942"/>
+            <a:chExt cx="561110" cy="586795"/>
+          </a:xfrm>
+        </p:grpSpPr>
+        <p:sp>
+          <p:nvSpPr>
+            <p:cNvPr id="19" name="Rectangle 18"/>
+            <p:cNvSpPr/>
+            <p:nvPr/>
+          </p:nvSpPr>
+          <p:spPr>
+            <a:xfrm>
+              <a:off x="5392881" y="2251942"/>
+              <a:ext cx="561110" cy="561110"/>
+            </a:xfrm>
+            <a:prstGeom prst="rect">
+              <a:avLst/>
+            </a:prstGeom>
+          </p:spPr>
+          <p:style>
+            <a:lnRef idx="2">
+              <a:schemeClr val="accent1">
+                <a:shade val="50000"/>
+              </a:schemeClr>
+            </a:lnRef>
+            <a:fillRef idx="1">
+              <a:schemeClr val="accent1"/>
+            </a:fillRef>
+            <a:effectRef idx="0">
+              <a:schemeClr val="accent1"/>
+            </a:effectRef>
+            <a:fontRef idx="minor">
+              <a:schemeClr val="lt1"/>
+            </a:fontRef>
+          </p:style>
+          <p:txBody>
+            <a:bodyPr rtlCol="0" anchor="ctr"/>
+            <a:lstStyle/>
+            <a:p>
+              <a:pPr algn="ctr"/>
+              <a:endParaRPr lang="en-US"/>
+            </a:p>
+          </p:txBody>
+        </p:sp>
+        <p:sp>
+          <p:nvSpPr>
+            <p:cNvPr id="20" name="Oval 19"/>
+            <p:cNvSpPr/>
+            <p:nvPr/>
+          </p:nvSpPr>
+          <p:spPr>
+            <a:xfrm>
+              <a:off x="5528395" y="2400299"/>
+              <a:ext cx="290081" cy="290081"/>
+            </a:xfrm>
+            <a:prstGeom prst="ellipse">
+              <a:avLst/>
+            </a:prstGeom>
+            <a:solidFill>
+              <a:schemeClr val="bg1"/>
+            </a:solidFill>
+            <a:ln>
+              <a:solidFill>
+                <a:schemeClr val="accent5">
+                  <a:lumMod val="60000"/>
+                  <a:lumOff val="40000"/>
+                </a:schemeClr>
+              </a:solidFill>
+            </a:ln>
+          </p:spPr>
+          <p:style>
+            <a:lnRef idx="2">
+              <a:schemeClr val="accent1">
+                <a:shade val="50000"/>
+              </a:schemeClr>
+            </a:lnRef>
+            <a:fillRef idx="1">
+              <a:schemeClr val="accent1"/>
+            </a:fillRef>
+            <a:effectRef idx="0">
+              <a:schemeClr val="accent1"/>
+            </a:effectRef>
+            <a:fontRef idx="minor">
+              <a:schemeClr val="lt1"/>
+            </a:fontRef>
+          </p:style>
+          <p:txBody>
+            <a:bodyPr rtlCol="0" anchor="ctr"/>
+            <a:lstStyle/>
+            <a:p>
+              <a:pPr algn="ctr"/>
+              <a:endParaRPr lang="en-US"/>
+            </a:p>
+          </p:txBody>
+        </p:sp>
+        <p:sp>
+          <p:nvSpPr>
+            <p:cNvPr id="21" name="Snip Same Side Corner Rectangle 20"/>
+            <p:cNvSpPr/>
+            <p:nvPr/>
+          </p:nvSpPr>
+          <p:spPr>
+            <a:xfrm>
+              <a:off x="5528395" y="2703222"/>
+              <a:ext cx="311727" cy="135515"/>
+            </a:xfrm>
+            <a:prstGeom prst="snip2SameRect">
+              <a:avLst/>
+            </a:prstGeom>
+            <a:solidFill>
+              <a:schemeClr val="bg1"/>
+            </a:solidFill>
+            <a:ln>
+              <a:noFill/>
+            </a:ln>
+          </p:spPr>
+          <p:style>
+            <a:lnRef idx="2">
+              <a:schemeClr val="accent1">
+                <a:shade val="50000"/>
+              </a:schemeClr>
+            </a:lnRef>
+            <a:fillRef idx="1">
+              <a:schemeClr val="accent1"/>
+            </a:fillRef>
+            <a:effectRef idx="0">
+              <a:schemeClr val="accent1"/>
+            </a:effectRef>
+            <a:fontRef idx="minor">
+              <a:schemeClr val="lt1"/>
+            </a:fontRef>
+          </p:style>
+          <p:txBody>
+            <a:bodyPr rtlCol="0" anchor="ctr"/>
+            <a:lstStyle/>
+            <a:p>
+              <a:pPr algn="ctr"/>
+              <a:endParaRPr lang="en-US"/>
+            </a:p>
+          </p:txBody>
+        </p:sp>
+      </p:grpSp>
+      <p:grpSp>
+        <p:nvGrpSpPr>
+          <p:cNvPr id="22" name="Group 21"/>
+          <p:cNvGrpSpPr/>
+          <p:nvPr/>
+        </p:nvGrpSpPr>
+        <p:grpSpPr>
+          <a:xfrm>
+            <a:off x="749005" y="4195929"/>
+            <a:ext cx="561110" cy="586795"/>
+            <a:chOff x="5392881" y="2251942"/>
+            <a:chExt cx="561110" cy="586795"/>
+          </a:xfrm>
+        </p:grpSpPr>
+        <p:sp>
+          <p:nvSpPr>
+            <p:cNvPr id="23" name="Rectangle 22"/>
+            <p:cNvSpPr/>
+            <p:nvPr/>
+          </p:nvSpPr>
+          <p:spPr>
+            <a:xfrm>
+              <a:off x="5392881" y="2251942"/>
+              <a:ext cx="561110" cy="561110"/>
+            </a:xfrm>
+            <a:prstGeom prst="rect">
+              <a:avLst/>
+            </a:prstGeom>
+          </p:spPr>
+          <p:style>
+            <a:lnRef idx="2">
+              <a:schemeClr val="accent1">
+                <a:shade val="50000"/>
+              </a:schemeClr>
+            </a:lnRef>
+            <a:fillRef idx="1">
+              <a:schemeClr val="accent1"/>
+            </a:fillRef>
+            <a:effectRef idx="0">
+              <a:schemeClr val="accent1"/>
+            </a:effectRef>
+            <a:fontRef idx="minor">
+              <a:schemeClr val="lt1"/>
+            </a:fontRef>
+          </p:style>
+          <p:txBody>
+            <a:bodyPr rtlCol="0" anchor="ctr"/>
+            <a:lstStyle/>
+            <a:p>
+              <a:pPr algn="ctr"/>
+              <a:endParaRPr lang="en-US"/>
+            </a:p>
+          </p:txBody>
+        </p:sp>
+        <p:sp>
+          <p:nvSpPr>
+            <p:cNvPr id="24" name="Oval 23"/>
+            <p:cNvSpPr/>
+            <p:nvPr/>
+          </p:nvSpPr>
+          <p:spPr>
+            <a:xfrm>
+              <a:off x="5528395" y="2400299"/>
+              <a:ext cx="290081" cy="290081"/>
+            </a:xfrm>
+            <a:prstGeom prst="ellipse">
+              <a:avLst/>
+            </a:prstGeom>
+            <a:solidFill>
+              <a:schemeClr val="bg1"/>
+            </a:solidFill>
+            <a:ln>
+              <a:solidFill>
+                <a:schemeClr val="accent5">
+                  <a:lumMod val="60000"/>
+                  <a:lumOff val="40000"/>
+                </a:schemeClr>
+              </a:solidFill>
+            </a:ln>
+          </p:spPr>
+          <p:style>
+            <a:lnRef idx="2">
+              <a:schemeClr val="accent1">
+                <a:shade val="50000"/>
+              </a:schemeClr>
+            </a:lnRef>
+            <a:fillRef idx="1">
+              <a:schemeClr val="accent1"/>
+            </a:fillRef>
+            <a:effectRef idx="0">
+              <a:schemeClr val="accent1"/>
+            </a:effectRef>
+            <a:fontRef idx="minor">
+              <a:schemeClr val="lt1"/>
+            </a:fontRef>
+          </p:style>
+          <p:txBody>
+            <a:bodyPr rtlCol="0" anchor="ctr"/>
+            <a:lstStyle/>
+            <a:p>
+              <a:pPr algn="ctr"/>
+              <a:endParaRPr lang="en-US"/>
+            </a:p>
+          </p:txBody>
+        </p:sp>
+        <p:sp>
+          <p:nvSpPr>
+            <p:cNvPr id="25" name="Snip Same Side Corner Rectangle 24"/>
+            <p:cNvSpPr/>
+            <p:nvPr/>
+          </p:nvSpPr>
+          <p:spPr>
+            <a:xfrm>
+              <a:off x="5528395" y="2703222"/>
+              <a:ext cx="311727" cy="135515"/>
+            </a:xfrm>
+            <a:prstGeom prst="snip2SameRect">
+              <a:avLst/>
+            </a:prstGeom>
+            <a:solidFill>
+              <a:schemeClr val="bg1"/>
+            </a:solidFill>
+            <a:ln>
+              <a:noFill/>
+            </a:ln>
+          </p:spPr>
+          <p:style>
+            <a:lnRef idx="2">
+              <a:schemeClr val="accent1">
+                <a:shade val="50000"/>
+              </a:schemeClr>
+            </a:lnRef>
+            <a:fillRef idx="1">
+              <a:schemeClr val="accent1"/>
+            </a:fillRef>
+            <a:effectRef idx="0">
+              <a:schemeClr val="accent1"/>
+            </a:effectRef>
+            <a:fontRef idx="minor">
+              <a:schemeClr val="lt1"/>
+            </a:fontRef>
+          </p:style>
+          <p:txBody>
+            <a:bodyPr rtlCol="0" anchor="ctr"/>
+            <a:lstStyle/>
+            <a:p>
+              <a:pPr algn="ctr"/>
+              <a:endParaRPr lang="en-US"/>
+            </a:p>
+          </p:txBody>
+        </p:sp>
+      </p:grpSp>
+      <p:grpSp>
+        <p:nvGrpSpPr>
+          <p:cNvPr id="26" name="Group 25"/>
+          <p:cNvGrpSpPr/>
+          <p:nvPr/>
+        </p:nvGrpSpPr>
+        <p:grpSpPr>
+          <a:xfrm>
+            <a:off x="769787" y="4884042"/>
+            <a:ext cx="561110" cy="586795"/>
+            <a:chOff x="5392881" y="2251942"/>
+            <a:chExt cx="561110" cy="586795"/>
+          </a:xfrm>
+        </p:grpSpPr>
+        <p:sp>
+          <p:nvSpPr>
+            <p:cNvPr id="27" name="Rectangle 26"/>
+            <p:cNvSpPr/>
+            <p:nvPr/>
+          </p:nvSpPr>
+          <p:spPr>
+            <a:xfrm>
+              <a:off x="5392881" y="2251942"/>
+              <a:ext cx="561110" cy="561110"/>
+            </a:xfrm>
+            <a:prstGeom prst="rect">
+              <a:avLst/>
+            </a:prstGeom>
+          </p:spPr>
+          <p:style>
+            <a:lnRef idx="2">
+              <a:schemeClr val="accent1">
+                <a:shade val="50000"/>
+              </a:schemeClr>
+            </a:lnRef>
+            <a:fillRef idx="1">
+              <a:schemeClr val="accent1"/>
+            </a:fillRef>
+            <a:effectRef idx="0">
+              <a:schemeClr val="accent1"/>
+            </a:effectRef>
+            <a:fontRef idx="minor">
+              <a:schemeClr val="lt1"/>
+            </a:fontRef>
+          </p:style>
+          <p:txBody>
+            <a:bodyPr rtlCol="0" anchor="ctr"/>
+            <a:lstStyle/>
+            <a:p>
+              <a:pPr algn="ctr"/>
+              <a:endParaRPr lang="en-US"/>
+            </a:p>
+          </p:txBody>
+        </p:sp>
+        <p:sp>
+          <p:nvSpPr>
+            <p:cNvPr id="28" name="Oval 27"/>
+            <p:cNvSpPr/>
+            <p:nvPr/>
+          </p:nvSpPr>
+          <p:spPr>
+            <a:xfrm>
+              <a:off x="5528395" y="2400299"/>
+              <a:ext cx="290081" cy="290081"/>
+            </a:xfrm>
+            <a:prstGeom prst="ellipse">
+              <a:avLst/>
+            </a:prstGeom>
+            <a:solidFill>
+              <a:schemeClr val="bg1"/>
+            </a:solidFill>
+            <a:ln>
+              <a:solidFill>
+                <a:schemeClr val="accent5">
+                  <a:lumMod val="60000"/>
+                  <a:lumOff val="40000"/>
+                </a:schemeClr>
+              </a:solidFill>
+            </a:ln>
+          </p:spPr>
+          <p:style>
+            <a:lnRef idx="2">
+              <a:schemeClr val="accent1">
+                <a:shade val="50000"/>
+              </a:schemeClr>
+            </a:lnRef>
+            <a:fillRef idx="1">
+              <a:schemeClr val="accent1"/>
+            </a:fillRef>
+            <a:effectRef idx="0">
+              <a:schemeClr val="accent1"/>
+            </a:effectRef>
+            <a:fontRef idx="minor">
+              <a:schemeClr val="lt1"/>
+            </a:fontRef>
+          </p:style>
+          <p:txBody>
+            <a:bodyPr rtlCol="0" anchor="ctr"/>
+            <a:lstStyle/>
+            <a:p>
+              <a:pPr algn="ctr"/>
+              <a:endParaRPr lang="en-US"/>
+            </a:p>
+          </p:txBody>
+        </p:sp>
+        <p:sp>
+          <p:nvSpPr>
+            <p:cNvPr id="29" name="Snip Same Side Corner Rectangle 28"/>
+            <p:cNvSpPr/>
+            <p:nvPr/>
+          </p:nvSpPr>
+          <p:spPr>
+            <a:xfrm>
+              <a:off x="5528395" y="2703222"/>
+              <a:ext cx="311727" cy="135515"/>
+            </a:xfrm>
+            <a:prstGeom prst="snip2SameRect">
+              <a:avLst/>
+            </a:prstGeom>
+            <a:solidFill>
+              <a:schemeClr val="bg1"/>
+            </a:solidFill>
+            <a:ln>
+              <a:noFill/>
+            </a:ln>
+          </p:spPr>
+          <p:style>
+            <a:lnRef idx="2">
+              <a:schemeClr val="accent1">
+                <a:shade val="50000"/>
+              </a:schemeClr>
+            </a:lnRef>
+            <a:fillRef idx="1">
+              <a:schemeClr val="accent1"/>
+            </a:fillRef>
+            <a:effectRef idx="0">
+              <a:schemeClr val="accent1"/>
+            </a:effectRef>
+            <a:fontRef idx="minor">
+              <a:schemeClr val="lt1"/>
+            </a:fontRef>
+          </p:style>
+          <p:txBody>
+            <a:bodyPr rtlCol="0" anchor="ctr"/>
+            <a:lstStyle/>
+            <a:p>
+              <a:pPr algn="ctr"/>
+              <a:endParaRPr lang="en-US"/>
+            </a:p>
+          </p:txBody>
+        </p:sp>
+      </p:grpSp>
+      <p:sp>
+        <p:nvSpPr>
+          <p:cNvPr id="35" name="TextBox 34"/>
+          <p:cNvSpPr txBox="1"/>
+          <p:nvPr/>
+        </p:nvSpPr>
+        <p:spPr>
+          <a:xfrm>
+            <a:off x="1309254" y="2092599"/>
+            <a:ext cx="3148445" cy="253916"/>
+          </a:xfrm>
+          <a:prstGeom prst="rect">
+            <a:avLst/>
+          </a:prstGeom>
+          <a:noFill/>
+        </p:spPr>
+        <p:txBody>
+          <a:bodyPr wrap="square" rtlCol="0">
+            <a:spAutoFit/>
+          </a:bodyPr>
+          <a:lstStyle/>
+          <a:p>
+            <a:r>
+              <a:rPr lang="en-US" sz="1000" b="1" dirty="0" smtClean="0">
+                <a:latin typeface="Segoe UI Light" panose="020B0502040204020203" pitchFamily="34" charset="0"/>
+                <a:cs typeface="Segoe UI Light" panose="020B0502040204020203" pitchFamily="34" charset="0"/>
+              </a:rPr>
+              <a:t>Jennifer Kline </a:t>
+            </a:r>
+            <a:r>
+              <a:rPr lang="en-US" sz="1000" dirty="0" smtClean="0">
+                <a:latin typeface="Segoe UI Light" panose="020B0502040204020203" pitchFamily="34" charset="0"/>
+                <a:cs typeface="Segoe UI Light" panose="020B0502040204020203" pitchFamily="34" charset="0"/>
+              </a:rPr>
+              <a:t>paid </a:t>
+            </a:r>
+            <a:r>
+              <a:rPr lang="en-US" sz="1000" b="1" dirty="0" smtClean="0">
+                <a:latin typeface="Segoe UI Light" panose="020B0502040204020203" pitchFamily="34" charset="0"/>
+                <a:cs typeface="Segoe UI Light" panose="020B0502040204020203" pitchFamily="34" charset="0"/>
+              </a:rPr>
+              <a:t>Teddy Smith </a:t>
+            </a:r>
+            <a:endParaRPr lang="en-US" sz="1000" dirty="0">
+              <a:solidFill>
+                <a:schemeClr val="accent1">
+                  <a:lumMod val="75000"/>
+                </a:schemeClr>
+              </a:solidFill>
+              <a:latin typeface="Segoe UI Light" panose="020B0502040204020203" pitchFamily="34" charset="0"/>
+              <a:cs typeface="Segoe UI Light" panose="020B0502040204020203" pitchFamily="34" charset="0"/>
+            </a:endParaRPr>
+          </a:p>
+        </p:txBody>
+      </p:sp>
+      <p:sp>
+        <p:nvSpPr>
+          <p:cNvPr id="36" name="TextBox 35"/>
+          <p:cNvSpPr txBox="1"/>
+          <p:nvPr/>
+        </p:nvSpPr>
+        <p:spPr>
+          <a:xfrm>
+            <a:off x="1320074" y="2794869"/>
+            <a:ext cx="3148445" cy="253916"/>
+          </a:xfrm>
+          <a:prstGeom prst="rect">
+            <a:avLst/>
+          </a:prstGeom>
+          <a:noFill/>
+        </p:spPr>
+        <p:txBody>
+          <a:bodyPr wrap="square" rtlCol="0">
+            <a:spAutoFit/>
+          </a:bodyPr>
+          <a:lstStyle/>
+          <a:p>
+            <a:r>
+              <a:rPr lang="en-US" sz="1000" b="1" dirty="0" smtClean="0">
+                <a:latin typeface="Segoe UI Light" panose="020B0502040204020203" pitchFamily="34" charset="0"/>
+                <a:cs typeface="Segoe UI Light" panose="020B0502040204020203" pitchFamily="34" charset="0"/>
+              </a:rPr>
+              <a:t>Brody Keller </a:t>
+            </a:r>
+            <a:r>
+              <a:rPr lang="en-US" sz="1000" dirty="0" smtClean="0">
+                <a:latin typeface="Segoe UI Light" panose="020B0502040204020203" pitchFamily="34" charset="0"/>
+                <a:cs typeface="Segoe UI Light" panose="020B0502040204020203" pitchFamily="34" charset="0"/>
+              </a:rPr>
+              <a:t>paid </a:t>
+            </a:r>
+            <a:r>
+              <a:rPr lang="en-US" sz="1000" b="1" dirty="0" smtClean="0">
+                <a:latin typeface="Segoe UI Light" panose="020B0502040204020203" pitchFamily="34" charset="0"/>
+                <a:cs typeface="Segoe UI Light" panose="020B0502040204020203" pitchFamily="34" charset="0"/>
+              </a:rPr>
+              <a:t>Corey Kay</a:t>
+            </a:r>
+            <a:endParaRPr lang="en-US" sz="1000" dirty="0">
+              <a:solidFill>
+                <a:schemeClr val="accent1">
+                  <a:lumMod val="75000"/>
+                </a:schemeClr>
+              </a:solidFill>
+              <a:latin typeface="Segoe UI Light" panose="020B0502040204020203" pitchFamily="34" charset="0"/>
+              <a:cs typeface="Segoe UI Light" panose="020B0502040204020203" pitchFamily="34" charset="0"/>
+            </a:endParaRPr>
+          </a:p>
+        </p:txBody>
+      </p:sp>
+      <p:sp>
+        <p:nvSpPr>
+          <p:cNvPr id="37" name="TextBox 36"/>
+          <p:cNvSpPr txBox="1"/>
+          <p:nvPr/>
+        </p:nvSpPr>
+        <p:spPr>
+          <a:xfrm>
+            <a:off x="1309253" y="3508809"/>
+            <a:ext cx="3148445" cy="253916"/>
+          </a:xfrm>
+          <a:prstGeom prst="rect">
+            <a:avLst/>
+          </a:prstGeom>
+          <a:noFill/>
+        </p:spPr>
+        <p:txBody>
+          <a:bodyPr wrap="square" rtlCol="0">
+            <a:spAutoFit/>
+          </a:bodyPr>
+          <a:lstStyle/>
+          <a:p>
+            <a:r>
+              <a:rPr lang="en-US" sz="1000" b="1" dirty="0" smtClean="0">
+                <a:latin typeface="Segoe UI Light" panose="020B0502040204020203" pitchFamily="34" charset="0"/>
+                <a:cs typeface="Segoe UI Light" panose="020B0502040204020203" pitchFamily="34" charset="0"/>
+              </a:rPr>
+              <a:t>Brandon Maxwell </a:t>
+            </a:r>
+            <a:r>
+              <a:rPr lang="en-US" sz="1000" dirty="0" smtClean="0">
+                <a:latin typeface="Segoe UI Light" panose="020B0502040204020203" pitchFamily="34" charset="0"/>
+                <a:cs typeface="Segoe UI Light" panose="020B0502040204020203" pitchFamily="34" charset="0"/>
+              </a:rPr>
+              <a:t>paid </a:t>
+            </a:r>
+            <a:r>
+              <a:rPr lang="en-US" sz="1000" b="1" dirty="0" smtClean="0">
+                <a:latin typeface="Segoe UI Light" panose="020B0502040204020203" pitchFamily="34" charset="0"/>
+                <a:cs typeface="Segoe UI Light" panose="020B0502040204020203" pitchFamily="34" charset="0"/>
+              </a:rPr>
+              <a:t>Corey Kay</a:t>
+            </a:r>
+            <a:endParaRPr lang="en-US" sz="1000" dirty="0">
+              <a:solidFill>
+                <a:schemeClr val="accent1">
+                  <a:lumMod val="75000"/>
+                </a:schemeClr>
+              </a:solidFill>
+              <a:latin typeface="Segoe UI Light" panose="020B0502040204020203" pitchFamily="34" charset="0"/>
+              <a:cs typeface="Segoe UI Light" panose="020B0502040204020203" pitchFamily="34" charset="0"/>
+            </a:endParaRPr>
+          </a:p>
+        </p:txBody>
+      </p:sp>
+      <p:sp>
+        <p:nvSpPr>
+          <p:cNvPr id="38" name="TextBox 37"/>
+          <p:cNvSpPr txBox="1"/>
+          <p:nvPr/>
+        </p:nvSpPr>
+        <p:spPr>
+          <a:xfrm>
+            <a:off x="1342579" y="4195929"/>
+            <a:ext cx="3148445" cy="253916"/>
+          </a:xfrm>
+          <a:prstGeom prst="rect">
+            <a:avLst/>
+          </a:prstGeom>
+          <a:noFill/>
+        </p:spPr>
+        <p:txBody>
+          <a:bodyPr wrap="square" rtlCol="0">
+            <a:spAutoFit/>
+          </a:bodyPr>
+          <a:lstStyle/>
+          <a:p>
+            <a:r>
+              <a:rPr lang="en-US" sz="1000" b="1" dirty="0" smtClean="0">
+                <a:latin typeface="Segoe UI Light" panose="020B0502040204020203" pitchFamily="34" charset="0"/>
+                <a:cs typeface="Segoe UI Light" panose="020B0502040204020203" pitchFamily="34" charset="0"/>
+              </a:rPr>
+              <a:t>Steve Johnston </a:t>
+            </a:r>
+            <a:r>
+              <a:rPr lang="en-US" sz="1000" dirty="0" smtClean="0">
+                <a:latin typeface="Segoe UI Light" panose="020B0502040204020203" pitchFamily="34" charset="0"/>
+                <a:cs typeface="Segoe UI Light" panose="020B0502040204020203" pitchFamily="34" charset="0"/>
+              </a:rPr>
+              <a:t>paid </a:t>
+            </a:r>
+            <a:r>
+              <a:rPr lang="en-US" sz="1000" b="1" dirty="0" smtClean="0">
+                <a:latin typeface="Segoe UI Light" panose="020B0502040204020203" pitchFamily="34" charset="0"/>
+                <a:cs typeface="Segoe UI Light" panose="020B0502040204020203" pitchFamily="34" charset="0"/>
+              </a:rPr>
+              <a:t>Gary Alba</a:t>
+            </a:r>
+            <a:endParaRPr lang="en-US" sz="1000" dirty="0">
+              <a:solidFill>
+                <a:schemeClr val="accent1">
+                  <a:lumMod val="75000"/>
+                </a:schemeClr>
+              </a:solidFill>
+              <a:latin typeface="Segoe UI Light" panose="020B0502040204020203" pitchFamily="34" charset="0"/>
+              <a:cs typeface="Segoe UI Light" panose="020B0502040204020203" pitchFamily="34" charset="0"/>
+            </a:endParaRPr>
+          </a:p>
+        </p:txBody>
+      </p:sp>
+      <p:sp>
+        <p:nvSpPr>
+          <p:cNvPr id="39" name="TextBox 38"/>
+          <p:cNvSpPr txBox="1"/>
+          <p:nvPr/>
+        </p:nvSpPr>
+        <p:spPr>
+          <a:xfrm>
+            <a:off x="1342579" y="4887757"/>
+            <a:ext cx="3148445" cy="253916"/>
+          </a:xfrm>
+          <a:prstGeom prst="rect">
+            <a:avLst/>
+          </a:prstGeom>
+          <a:noFill/>
+        </p:spPr>
+        <p:txBody>
+          <a:bodyPr wrap="square" rtlCol="0">
+            <a:spAutoFit/>
+          </a:bodyPr>
+          <a:lstStyle/>
+          <a:p>
+            <a:r>
+              <a:rPr lang="en-US" sz="1000" b="1" dirty="0" smtClean="0">
+                <a:latin typeface="Segoe UI Light" panose="020B0502040204020203" pitchFamily="34" charset="0"/>
+                <a:cs typeface="Segoe UI Light" panose="020B0502040204020203" pitchFamily="34" charset="0"/>
+              </a:rPr>
+              <a:t>Martin James </a:t>
+            </a:r>
+            <a:r>
+              <a:rPr lang="en-US" sz="1000" dirty="0" smtClean="0">
+                <a:latin typeface="Segoe UI Light" panose="020B0502040204020203" pitchFamily="34" charset="0"/>
+                <a:cs typeface="Segoe UI Light" panose="020B0502040204020203" pitchFamily="34" charset="0"/>
+              </a:rPr>
+              <a:t>charged </a:t>
+            </a:r>
+            <a:r>
+              <a:rPr lang="en-US" sz="1000" b="1" dirty="0" smtClean="0">
+                <a:latin typeface="Segoe UI Light" panose="020B0502040204020203" pitchFamily="34" charset="0"/>
+                <a:cs typeface="Segoe UI Light" panose="020B0502040204020203" pitchFamily="34" charset="0"/>
+              </a:rPr>
+              <a:t>Judy Keller</a:t>
+            </a:r>
+            <a:endParaRPr lang="en-US" sz="1000" dirty="0">
+              <a:solidFill>
+                <a:schemeClr val="accent1">
+                  <a:lumMod val="75000"/>
+                </a:schemeClr>
+              </a:solidFill>
+              <a:latin typeface="Segoe UI Light" panose="020B0502040204020203" pitchFamily="34" charset="0"/>
+              <a:cs typeface="Segoe UI Light" panose="020B0502040204020203" pitchFamily="34" charset="0"/>
+            </a:endParaRPr>
+          </a:p>
+        </p:txBody>
+      </p:sp>
+      <p:sp>
+        <p:nvSpPr>
+          <p:cNvPr id="41" name="TextBox 40"/>
+          <p:cNvSpPr txBox="1"/>
+          <p:nvPr/>
+        </p:nvSpPr>
+        <p:spPr>
+          <a:xfrm>
+            <a:off x="780609" y="1636683"/>
+            <a:ext cx="1653017" cy="261610"/>
+          </a:xfrm>
+          <a:prstGeom prst="rect">
+            <a:avLst/>
+          </a:prstGeom>
+          <a:noFill/>
+        </p:spPr>
+        <p:txBody>
+          <a:bodyPr wrap="none" rtlCol="0">
+            <a:spAutoFit/>
+          </a:bodyPr>
+          <a:lstStyle/>
+          <a:p>
+            <a:r>
+              <a:rPr lang="en-US" sz="1100" dirty="0" smtClean="0">
+                <a:latin typeface="Segoe UI Light" panose="020B0502040204020203" pitchFamily="34" charset="0"/>
+                <a:cs typeface="Segoe UI Light" panose="020B0502040204020203" pitchFamily="34" charset="0"/>
+              </a:rPr>
+              <a:t>TRANSACTION HISTORY</a:t>
+            </a:r>
+            <a:endParaRPr lang="en-US" sz="1100" dirty="0">
+              <a:latin typeface="Segoe UI Light" panose="020B0502040204020203" pitchFamily="34" charset="0"/>
+              <a:cs typeface="Segoe UI Light" panose="020B0502040204020203" pitchFamily="34" charset="0"/>
+            </a:endParaRPr>
+          </a:p>
+        </p:txBody>
+      </p:sp>
+    </p:spTree>
+    <p:extLst>
+      <p:ext uri="{BB962C8B-B14F-4D97-AF65-F5344CB8AC3E}">
+        <p14:creationId xmlns:p14="http://schemas.microsoft.com/office/powerpoint/2010/main" val="1024312178"/>
       </p:ext>
     </p:extLst>
   </p:cSld>

</xml_diff>